<commit_message>
Update AMAZON WEB SERVİSLERİ.pptx
</commit_message>
<xml_diff>
--- a/AMAZON WEB SERVİSLERİ.pptx
+++ b/AMAZON WEB SERVİSLERİ.pptx
@@ -15,8 +15,8 @@
     <p:sldId id="263" r:id="rId9"/>
     <p:sldId id="264" r:id="rId10"/>
     <p:sldId id="265" r:id="rId11"/>
-    <p:sldId id="266" r:id="rId12"/>
-    <p:sldId id="267" r:id="rId13"/>
+    <p:sldId id="267" r:id="rId12"/>
+    <p:sldId id="266" r:id="rId13"/>
     <p:sldId id="269" r:id="rId14"/>
     <p:sldId id="270" r:id="rId15"/>
     <p:sldId id="271" r:id="rId16"/>
@@ -58,6 +58,7 @@
     <p:sldId id="307" r:id="rId52"/>
     <p:sldId id="308" r:id="rId53"/>
     <p:sldId id="309" r:id="rId54"/>
+    <p:sldId id="310" r:id="rId55"/>
   </p:sldIdLst>
   <p:sldSz cx="12192000" cy="6858000"/>
   <p:notesSz cx="6858000" cy="9144000"/>
@@ -167,7 +168,7 @@
 <file path=ppt/revisionInfo.xml><?xml version="1.0" encoding="utf-8"?>
 <p1510:revInfo xmlns:a="http://schemas.openxmlformats.org/drawingml/2006/main" xmlns:r="http://schemas.openxmlformats.org/officeDocument/2006/relationships" xmlns:p1510="http://schemas.microsoft.com/office/powerpoint/2015/10/main">
   <p1510:revLst>
-    <p1510:client id="{31B3CA74-C362-4613-88F7-C0DE12580896}" v="111" dt="2023-09-06T15:08:21.133"/>
+    <p1510:client id="{5B757141-E8A7-4EC0-86A4-AEA6CB375CF0}" v="8" dt="2023-09-26T09:17:43.020"/>
   </p1510:revLst>
 </p1510:revInfo>
 </file>
@@ -1735,6 +1736,120 @@
       </pc:sldChg>
     </pc:docChg>
   </pc:docChgLst>
+  <pc:docChgLst>
+    <pc:chgData name="MELİK BUĞRA KILIÇ" userId="6754ca9d62ec3d41" providerId="LiveId" clId="{5B757141-E8A7-4EC0-86A4-AEA6CB375CF0}"/>
+    <pc:docChg chg="custSel modSld sldOrd">
+      <pc:chgData name="MELİK BUĞRA KILIÇ" userId="6754ca9d62ec3d41" providerId="LiveId" clId="{5B757141-E8A7-4EC0-86A4-AEA6CB375CF0}" dt="2023-09-26T09:19:02.966" v="173" actId="20577"/>
+      <pc:docMkLst>
+        <pc:docMk/>
+      </pc:docMkLst>
+      <pc:sldChg chg="modSp mod ord">
+        <pc:chgData name="MELİK BUĞRA KILIÇ" userId="6754ca9d62ec3d41" providerId="LiveId" clId="{5B757141-E8A7-4EC0-86A4-AEA6CB375CF0}" dt="2023-09-18T08:43:46.850" v="85"/>
+        <pc:sldMkLst>
+          <pc:docMk/>
+          <pc:sldMk cId="2440872219" sldId="267"/>
+        </pc:sldMkLst>
+        <pc:spChg chg="mod">
+          <ac:chgData name="MELİK BUĞRA KILIÇ" userId="6754ca9d62ec3d41" providerId="LiveId" clId="{5B757141-E8A7-4EC0-86A4-AEA6CB375CF0}" dt="2023-09-18T08:43:18.465" v="83" actId="20577"/>
+          <ac:spMkLst>
+            <pc:docMk/>
+            <pc:sldMk cId="2440872219" sldId="267"/>
+            <ac:spMk id="12" creationId="{D8B886AB-FBCE-BCEA-4479-1579F3C87140}"/>
+          </ac:spMkLst>
+        </pc:spChg>
+      </pc:sldChg>
+      <pc:sldChg chg="modSp mod">
+        <pc:chgData name="MELİK BUĞRA KILIÇ" userId="6754ca9d62ec3d41" providerId="LiveId" clId="{5B757141-E8A7-4EC0-86A4-AEA6CB375CF0}" dt="2023-09-26T09:13:39.908" v="160" actId="20577"/>
+        <pc:sldMkLst>
+          <pc:docMk/>
+          <pc:sldMk cId="1057810541" sldId="279"/>
+        </pc:sldMkLst>
+        <pc:spChg chg="mod">
+          <ac:chgData name="MELİK BUĞRA KILIÇ" userId="6754ca9d62ec3d41" providerId="LiveId" clId="{5B757141-E8A7-4EC0-86A4-AEA6CB375CF0}" dt="2023-09-26T09:13:39.908" v="160" actId="20577"/>
+          <ac:spMkLst>
+            <pc:docMk/>
+            <pc:sldMk cId="1057810541" sldId="279"/>
+            <ac:spMk id="12" creationId="{D8B886AB-FBCE-BCEA-4479-1579F3C87140}"/>
+          </ac:spMkLst>
+        </pc:spChg>
+      </pc:sldChg>
+      <pc:sldChg chg="modSp mod">
+        <pc:chgData name="MELİK BUĞRA KILIÇ" userId="6754ca9d62ec3d41" providerId="LiveId" clId="{5B757141-E8A7-4EC0-86A4-AEA6CB375CF0}" dt="2023-09-26T09:15:26.925" v="164" actId="20577"/>
+        <pc:sldMkLst>
+          <pc:docMk/>
+          <pc:sldMk cId="4280894700" sldId="284"/>
+        </pc:sldMkLst>
+        <pc:spChg chg="mod">
+          <ac:chgData name="MELİK BUĞRA KILIÇ" userId="6754ca9d62ec3d41" providerId="LiveId" clId="{5B757141-E8A7-4EC0-86A4-AEA6CB375CF0}" dt="2023-09-26T09:15:26.925" v="164" actId="20577"/>
+          <ac:spMkLst>
+            <pc:docMk/>
+            <pc:sldMk cId="4280894700" sldId="284"/>
+            <ac:spMk id="12" creationId="{D8B886AB-FBCE-BCEA-4479-1579F3C87140}"/>
+          </ac:spMkLst>
+        </pc:spChg>
+      </pc:sldChg>
+      <pc:sldChg chg="modSp mod">
+        <pc:chgData name="MELİK BUĞRA KILIÇ" userId="6754ca9d62ec3d41" providerId="LiveId" clId="{5B757141-E8A7-4EC0-86A4-AEA6CB375CF0}" dt="2023-09-26T09:16:30.624" v="168" actId="27636"/>
+        <pc:sldMkLst>
+          <pc:docMk/>
+          <pc:sldMk cId="1607600679" sldId="288"/>
+        </pc:sldMkLst>
+        <pc:spChg chg="mod">
+          <ac:chgData name="MELİK BUĞRA KILIÇ" userId="6754ca9d62ec3d41" providerId="LiveId" clId="{5B757141-E8A7-4EC0-86A4-AEA6CB375CF0}" dt="2023-09-26T09:16:30.624" v="168" actId="27636"/>
+          <ac:spMkLst>
+            <pc:docMk/>
+            <pc:sldMk cId="1607600679" sldId="288"/>
+            <ac:spMk id="12" creationId="{D8B886AB-FBCE-BCEA-4479-1579F3C87140}"/>
+          </ac:spMkLst>
+        </pc:spChg>
+      </pc:sldChg>
+      <pc:sldChg chg="modSp mod">
+        <pc:chgData name="MELİK BUĞRA KILIÇ" userId="6754ca9d62ec3d41" providerId="LiveId" clId="{5B757141-E8A7-4EC0-86A4-AEA6CB375CF0}" dt="2023-09-26T09:17:57.070" v="172" actId="20577"/>
+        <pc:sldMkLst>
+          <pc:docMk/>
+          <pc:sldMk cId="3323886242" sldId="298"/>
+        </pc:sldMkLst>
+        <pc:spChg chg="mod">
+          <ac:chgData name="MELİK BUĞRA KILIÇ" userId="6754ca9d62ec3d41" providerId="LiveId" clId="{5B757141-E8A7-4EC0-86A4-AEA6CB375CF0}" dt="2023-09-26T09:17:57.070" v="172" actId="20577"/>
+          <ac:spMkLst>
+            <pc:docMk/>
+            <pc:sldMk cId="3323886242" sldId="298"/>
+            <ac:spMk id="12" creationId="{D8B886AB-FBCE-BCEA-4479-1579F3C87140}"/>
+          </ac:spMkLst>
+        </pc:spChg>
+      </pc:sldChg>
+      <pc:sldChg chg="modSp mod">
+        <pc:chgData name="MELİK BUĞRA KILIÇ" userId="6754ca9d62ec3d41" providerId="LiveId" clId="{5B757141-E8A7-4EC0-86A4-AEA6CB375CF0}" dt="2023-09-26T09:19:02.966" v="173" actId="20577"/>
+        <pc:sldMkLst>
+          <pc:docMk/>
+          <pc:sldMk cId="777698897" sldId="305"/>
+        </pc:sldMkLst>
+        <pc:spChg chg="mod">
+          <ac:chgData name="MELİK BUĞRA KILIÇ" userId="6754ca9d62ec3d41" providerId="LiveId" clId="{5B757141-E8A7-4EC0-86A4-AEA6CB375CF0}" dt="2023-09-26T09:19:02.966" v="173" actId="20577"/>
+          <ac:spMkLst>
+            <pc:docMk/>
+            <pc:sldMk cId="777698897" sldId="305"/>
+            <ac:spMk id="2" creationId="{D7D22C98-8BFA-E8A6-0AD6-08411FE2310A}"/>
+          </ac:spMkLst>
+        </pc:spChg>
+      </pc:sldChg>
+      <pc:sldChg chg="modSp mod">
+        <pc:chgData name="MELİK BUĞRA KILIÇ" userId="6754ca9d62ec3d41" providerId="LiveId" clId="{5B757141-E8A7-4EC0-86A4-AEA6CB375CF0}" dt="2023-09-17T20:25:20.262" v="3" actId="20577"/>
+        <pc:sldMkLst>
+          <pc:docMk/>
+          <pc:sldMk cId="1580297389" sldId="310"/>
+        </pc:sldMkLst>
+        <pc:spChg chg="mod">
+          <ac:chgData name="MELİK BUĞRA KILIÇ" userId="6754ca9d62ec3d41" providerId="LiveId" clId="{5B757141-E8A7-4EC0-86A4-AEA6CB375CF0}" dt="2023-09-17T20:25:20.262" v="3" actId="20577"/>
+          <ac:spMkLst>
+            <pc:docMk/>
+            <pc:sldMk cId="1580297389" sldId="310"/>
+            <ac:spMk id="3" creationId="{332A08EA-7E3F-65B8-C9CA-94F9514450A5}"/>
+          </ac:spMkLst>
+        </pc:spChg>
+      </pc:sldChg>
+    </pc:docChg>
+  </pc:docChgLst>
 </pc:chgInfo>
 </file>
 
@@ -2200,7 +2315,7 @@
           <a:p>
             <a:fld id="{CE4141D8-AC4F-4103-B5D0-A6CE5A1918D2}" type="datetimeFigureOut">
               <a:rPr lang="tr-TR" smtClean="0"/>
-              <a:t>6.09.2023</a:t>
+              <a:t>26.09.2023</a:t>
             </a:fld>
             <a:endParaRPr lang="tr-TR"/>
           </a:p>
@@ -2402,7 +2517,7 @@
           <a:p>
             <a:fld id="{CE4141D8-AC4F-4103-B5D0-A6CE5A1918D2}" type="datetimeFigureOut">
               <a:rPr lang="tr-TR" smtClean="0"/>
-              <a:t>6.09.2023</a:t>
+              <a:t>26.09.2023</a:t>
             </a:fld>
             <a:endParaRPr lang="tr-TR"/>
           </a:p>
@@ -2582,7 +2697,7 @@
           <a:p>
             <a:fld id="{CE4141D8-AC4F-4103-B5D0-A6CE5A1918D2}" type="datetimeFigureOut">
               <a:rPr lang="tr-TR" smtClean="0"/>
-              <a:t>6.09.2023</a:t>
+              <a:t>26.09.2023</a:t>
             </a:fld>
             <a:endParaRPr lang="tr-TR"/>
           </a:p>
@@ -2752,7 +2867,7 @@
           <a:p>
             <a:fld id="{CE4141D8-AC4F-4103-B5D0-A6CE5A1918D2}" type="datetimeFigureOut">
               <a:rPr lang="tr-TR" smtClean="0"/>
-              <a:t>6.09.2023</a:t>
+              <a:t>26.09.2023</a:t>
             </a:fld>
             <a:endParaRPr lang="tr-TR"/>
           </a:p>
@@ -3323,7 +3438,7 @@
           <a:p>
             <a:fld id="{CE4141D8-AC4F-4103-B5D0-A6CE5A1918D2}" type="datetimeFigureOut">
               <a:rPr lang="tr-TR" smtClean="0"/>
-              <a:t>6.09.2023</a:t>
+              <a:t>26.09.2023</a:t>
             </a:fld>
             <a:endParaRPr lang="tr-TR"/>
           </a:p>
@@ -3625,7 +3740,7 @@
           <a:p>
             <a:fld id="{CE4141D8-AC4F-4103-B5D0-A6CE5A1918D2}" type="datetimeFigureOut">
               <a:rPr lang="tr-TR" smtClean="0"/>
-              <a:t>6.09.2023</a:t>
+              <a:t>26.09.2023</a:t>
             </a:fld>
             <a:endParaRPr lang="tr-TR"/>
           </a:p>
@@ -4067,7 +4182,7 @@
           <a:p>
             <a:fld id="{CE4141D8-AC4F-4103-B5D0-A6CE5A1918D2}" type="datetimeFigureOut">
               <a:rPr lang="tr-TR" smtClean="0"/>
-              <a:t>6.09.2023</a:t>
+              <a:t>26.09.2023</a:t>
             </a:fld>
             <a:endParaRPr lang="tr-TR"/>
           </a:p>
@@ -4190,7 +4305,7 @@
           <a:p>
             <a:fld id="{CE4141D8-AC4F-4103-B5D0-A6CE5A1918D2}" type="datetimeFigureOut">
               <a:rPr lang="tr-TR" smtClean="0"/>
-              <a:t>6.09.2023</a:t>
+              <a:t>26.09.2023</a:t>
             </a:fld>
             <a:endParaRPr lang="tr-TR"/>
           </a:p>
@@ -4285,7 +4400,7 @@
           <a:p>
             <a:fld id="{CE4141D8-AC4F-4103-B5D0-A6CE5A1918D2}" type="datetimeFigureOut">
               <a:rPr lang="tr-TR" smtClean="0"/>
-              <a:t>6.09.2023</a:t>
+              <a:t>26.09.2023</a:t>
             </a:fld>
             <a:endParaRPr lang="tr-TR"/>
           </a:p>
@@ -4667,7 +4782,7 @@
           <a:p>
             <a:fld id="{CE4141D8-AC4F-4103-B5D0-A6CE5A1918D2}" type="datetimeFigureOut">
               <a:rPr lang="tr-TR" smtClean="0"/>
-              <a:t>6.09.2023</a:t>
+              <a:t>26.09.2023</a:t>
             </a:fld>
             <a:endParaRPr lang="tr-TR"/>
           </a:p>
@@ -5066,7 +5181,7 @@
           <a:p>
             <a:fld id="{CE4141D8-AC4F-4103-B5D0-A6CE5A1918D2}" type="datetimeFigureOut">
               <a:rPr lang="tr-TR" smtClean="0"/>
-              <a:t>6.09.2023</a:t>
+              <a:t>26.09.2023</a:t>
             </a:fld>
             <a:endParaRPr lang="tr-TR"/>
           </a:p>
@@ -5379,7 +5494,7 @@
           <a:p>
             <a:fld id="{CE4141D8-AC4F-4103-B5D0-A6CE5A1918D2}" type="datetimeFigureOut">
               <a:rPr lang="tr-TR" smtClean="0"/>
-              <a:t>6.09.2023</a:t>
+              <a:t>26.09.2023</a:t>
             </a:fld>
             <a:endParaRPr lang="tr-TR"/>
           </a:p>
@@ -6264,6 +6379,213 @@
         </p:nvSpPr>
         <p:spPr>
           <a:xfrm>
+            <a:off x="987489" y="1064712"/>
+            <a:ext cx="10515600" cy="5112251"/>
+          </a:xfrm>
+        </p:spPr>
+        <p:txBody>
+          <a:bodyPr>
+            <a:normAutofit/>
+          </a:bodyPr>
+          <a:lstStyle/>
+          <a:p>
+            <a:pPr marL="0" indent="0">
+              <a:buNone/>
+            </a:pPr>
+            <a:endParaRPr lang="tr-TR" sz="2600" dirty="0"/>
+          </a:p>
+          <a:p>
+            <a:pPr marL="0" indent="0">
+              <a:buNone/>
+            </a:pPr>
+            <a:endParaRPr lang="tr-TR" sz="2600" dirty="0"/>
+          </a:p>
+          <a:p>
+            <a:pPr marL="0" indent="0">
+              <a:buNone/>
+            </a:pPr>
+            <a:endParaRPr lang="tr-TR" sz="2600" dirty="0"/>
+          </a:p>
+          <a:p>
+            <a:pPr marL="0" indent="0">
+              <a:buNone/>
+            </a:pPr>
+            <a:endParaRPr lang="tr-TR" sz="2600" dirty="0"/>
+          </a:p>
+          <a:p>
+            <a:pPr marL="0" indent="0">
+              <a:buNone/>
+            </a:pPr>
+            <a:endParaRPr lang="tr-TR" sz="2600" dirty="0"/>
+          </a:p>
+          <a:p>
+            <a:pPr marL="0" indent="0">
+              <a:buNone/>
+            </a:pPr>
+            <a:endParaRPr lang="tr-TR" sz="2600" dirty="0"/>
+          </a:p>
+          <a:p>
+            <a:pPr marL="0" indent="0">
+              <a:buNone/>
+            </a:pPr>
+            <a:endParaRPr lang="tr-TR" sz="2600" dirty="0"/>
+          </a:p>
+          <a:p>
+            <a:pPr marL="0" indent="0">
+              <a:buNone/>
+            </a:pPr>
+            <a:endParaRPr lang="tr-TR" sz="2600" dirty="0"/>
+          </a:p>
+          <a:p>
+            <a:pPr marL="0" indent="0">
+              <a:buNone/>
+            </a:pPr>
+            <a:endParaRPr lang="tr-TR" sz="2600" dirty="0"/>
+          </a:p>
+          <a:p>
+            <a:pPr marL="0" indent="0" algn="just">
+              <a:buNone/>
+            </a:pPr>
+            <a:r>
+              <a:rPr lang="tr-TR" sz="2600" dirty="0"/>
+              <a:t>Burada Launch tuşuna basarak oluşturmaktayız.</a:t>
+            </a:r>
+          </a:p>
+        </p:txBody>
+      </p:sp>
+      <p:pic>
+        <p:nvPicPr>
+          <p:cNvPr id="5" name="Resim 4" descr="metin, ekran görüntüsü, yazılım, sayı, numara içeren bir resim">
+            <a:extLst>
+              <a:ext uri="{FF2B5EF4-FFF2-40B4-BE49-F238E27FC236}">
+                <a16:creationId xmlns:a16="http://schemas.microsoft.com/office/drawing/2014/main" id="{DD3FEA77-A250-8E51-C2F6-0954B01C524A}"/>
+              </a:ext>
+            </a:extLst>
+          </p:cNvPr>
+          <p:cNvPicPr>
+            <a:picLocks noChangeAspect="1"/>
+          </p:cNvPicPr>
+          <p:nvPr/>
+        </p:nvPicPr>
+        <p:blipFill>
+          <a:blip r:embed="rId2">
+            <a:extLst>
+              <a:ext uri="{28A0092B-C50C-407E-A947-70E740481C1C}">
+                <a14:useLocalDpi xmlns:a14="http://schemas.microsoft.com/office/drawing/2010/main" val="0"/>
+              </a:ext>
+            </a:extLst>
+          </a:blip>
+          <a:stretch>
+            <a:fillRect/>
+          </a:stretch>
+        </p:blipFill>
+        <p:spPr>
+          <a:xfrm>
+            <a:off x="2316270" y="1408753"/>
+            <a:ext cx="6126271" cy="4040493"/>
+          </a:xfrm>
+          <a:prstGeom prst="rect">
+            <a:avLst/>
+          </a:prstGeom>
+        </p:spPr>
+      </p:pic>
+    </p:spTree>
+    <p:extLst>
+      <p:ext uri="{BB962C8B-B14F-4D97-AF65-F5344CB8AC3E}">
+        <p14:creationId xmlns:p14="http://schemas.microsoft.com/office/powerpoint/2010/main" val="2440872219"/>
+      </p:ext>
+    </p:extLst>
+  </p:cSld>
+  <p:clrMapOvr>
+    <a:masterClrMapping/>
+  </p:clrMapOvr>
+</p:sld>
+</file>
+
+<file path=ppt/slides/slide12.xml><?xml version="1.0" encoding="utf-8"?>
+<p:sld xmlns:a="http://schemas.openxmlformats.org/drawingml/2006/main" xmlns:r="http://schemas.openxmlformats.org/officeDocument/2006/relationships" xmlns:p="http://schemas.openxmlformats.org/presentationml/2006/main">
+  <p:cSld>
+    <p:spTree>
+      <p:nvGrpSpPr>
+        <p:cNvPr id="1" name=""/>
+        <p:cNvGrpSpPr/>
+        <p:nvPr/>
+      </p:nvGrpSpPr>
+      <p:grpSpPr>
+        <a:xfrm>
+          <a:off x="0" y="0"/>
+          <a:ext cx="0" cy="0"/>
+          <a:chOff x="0" y="0"/>
+          <a:chExt cx="0" cy="0"/>
+        </a:xfrm>
+      </p:grpSpPr>
+      <p:sp>
+        <p:nvSpPr>
+          <p:cNvPr id="2" name="Başlık 1">
+            <a:extLst>
+              <a:ext uri="{FF2B5EF4-FFF2-40B4-BE49-F238E27FC236}">
+                <a16:creationId xmlns:a16="http://schemas.microsoft.com/office/drawing/2014/main" id="{D7D22C98-8BFA-E8A6-0AD6-08411FE2310A}"/>
+              </a:ext>
+            </a:extLst>
+          </p:cNvPr>
+          <p:cNvSpPr>
+            <a:spLocks noGrp="1"/>
+          </p:cNvSpPr>
+          <p:nvPr>
+            <p:ph type="title"/>
+          </p:nvPr>
+        </p:nvSpPr>
+        <p:spPr>
+          <a:xfrm>
+            <a:off x="838200" y="365126"/>
+            <a:ext cx="10515600" cy="459334"/>
+          </a:xfrm>
+        </p:spPr>
+        <p:txBody>
+          <a:bodyPr>
+            <a:normAutofit fontScale="90000"/>
+          </a:bodyPr>
+          <a:lstStyle/>
+          <a:p>
+            <a:pPr algn="l"/>
+            <a:r>
+              <a:rPr lang="tr-TR" b="1" i="0" dirty="0">
+                <a:solidFill>
+                  <a:srgbClr val="222222"/>
+                </a:solidFill>
+                <a:effectLst/>
+                <a:latin typeface="-apple-system"/>
+              </a:rPr>
+              <a:t>AMAZON EC2 (ELASTİC COMPUTE CLOUD)</a:t>
+            </a:r>
+            <a:endParaRPr lang="tr-TR" b="1" i="0" dirty="0">
+              <a:solidFill>
+                <a:srgbClr val="222222"/>
+              </a:solidFill>
+              <a:effectLst/>
+              <a:latin typeface="TMSans"/>
+            </a:endParaRPr>
+          </a:p>
+        </p:txBody>
+      </p:sp>
+      <p:sp>
+        <p:nvSpPr>
+          <p:cNvPr id="12" name="İçerik Yer Tutucusu 11">
+            <a:extLst>
+              <a:ext uri="{FF2B5EF4-FFF2-40B4-BE49-F238E27FC236}">
+                <a16:creationId xmlns:a16="http://schemas.microsoft.com/office/drawing/2014/main" id="{D8B886AB-FBCE-BCEA-4479-1579F3C87140}"/>
+              </a:ext>
+            </a:extLst>
+          </p:cNvPr>
+          <p:cNvSpPr>
+            <a:spLocks noGrp="1"/>
+          </p:cNvSpPr>
+          <p:nvPr>
+            <p:ph idx="1"/>
+          </p:nvPr>
+        </p:nvSpPr>
+        <p:spPr>
+          <a:xfrm>
             <a:off x="838200" y="1064712"/>
             <a:ext cx="10515600" cy="5112251"/>
           </a:xfrm>
@@ -6366,162 +6688,6 @@
     <p:extLst>
       <p:ext uri="{BB962C8B-B14F-4D97-AF65-F5344CB8AC3E}">
         <p14:creationId xmlns:p14="http://schemas.microsoft.com/office/powerpoint/2010/main" val="1908527445"/>
-      </p:ext>
-    </p:extLst>
-  </p:cSld>
-  <p:clrMapOvr>
-    <a:masterClrMapping/>
-  </p:clrMapOvr>
-</p:sld>
-</file>
-
-<file path=ppt/slides/slide12.xml><?xml version="1.0" encoding="utf-8"?>
-<p:sld xmlns:a="http://schemas.openxmlformats.org/drawingml/2006/main" xmlns:r="http://schemas.openxmlformats.org/officeDocument/2006/relationships" xmlns:p="http://schemas.openxmlformats.org/presentationml/2006/main">
-  <p:cSld>
-    <p:spTree>
-      <p:nvGrpSpPr>
-        <p:cNvPr id="1" name=""/>
-        <p:cNvGrpSpPr/>
-        <p:nvPr/>
-      </p:nvGrpSpPr>
-      <p:grpSpPr>
-        <a:xfrm>
-          <a:off x="0" y="0"/>
-          <a:ext cx="0" cy="0"/>
-          <a:chOff x="0" y="0"/>
-          <a:chExt cx="0" cy="0"/>
-        </a:xfrm>
-      </p:grpSpPr>
-      <p:sp>
-        <p:nvSpPr>
-          <p:cNvPr id="2" name="Başlık 1">
-            <a:extLst>
-              <a:ext uri="{FF2B5EF4-FFF2-40B4-BE49-F238E27FC236}">
-                <a16:creationId xmlns:a16="http://schemas.microsoft.com/office/drawing/2014/main" id="{D7D22C98-8BFA-E8A6-0AD6-08411FE2310A}"/>
-              </a:ext>
-            </a:extLst>
-          </p:cNvPr>
-          <p:cNvSpPr>
-            <a:spLocks noGrp="1"/>
-          </p:cNvSpPr>
-          <p:nvPr>
-            <p:ph type="title"/>
-          </p:nvPr>
-        </p:nvSpPr>
-        <p:spPr>
-          <a:xfrm>
-            <a:off x="838200" y="365126"/>
-            <a:ext cx="10515600" cy="459334"/>
-          </a:xfrm>
-        </p:spPr>
-        <p:txBody>
-          <a:bodyPr>
-            <a:normAutofit fontScale="90000"/>
-          </a:bodyPr>
-          <a:lstStyle/>
-          <a:p>
-            <a:pPr algn="l"/>
-            <a:r>
-              <a:rPr lang="tr-TR" b="1" i="0" dirty="0">
-                <a:solidFill>
-                  <a:srgbClr val="222222"/>
-                </a:solidFill>
-                <a:effectLst/>
-                <a:latin typeface="-apple-system"/>
-              </a:rPr>
-              <a:t>AMAZON EC2 (ELASTİC COMPUTE CLOUD)</a:t>
-            </a:r>
-            <a:endParaRPr lang="tr-TR" b="1" i="0" dirty="0">
-              <a:solidFill>
-                <a:srgbClr val="222222"/>
-              </a:solidFill>
-              <a:effectLst/>
-              <a:latin typeface="TMSans"/>
-            </a:endParaRPr>
-          </a:p>
-        </p:txBody>
-      </p:sp>
-      <p:sp>
-        <p:nvSpPr>
-          <p:cNvPr id="12" name="İçerik Yer Tutucusu 11">
-            <a:extLst>
-              <a:ext uri="{FF2B5EF4-FFF2-40B4-BE49-F238E27FC236}">
-                <a16:creationId xmlns:a16="http://schemas.microsoft.com/office/drawing/2014/main" id="{D8B886AB-FBCE-BCEA-4479-1579F3C87140}"/>
-              </a:ext>
-            </a:extLst>
-          </p:cNvPr>
-          <p:cNvSpPr>
-            <a:spLocks noGrp="1"/>
-          </p:cNvSpPr>
-          <p:nvPr>
-            <p:ph idx="1"/>
-          </p:nvPr>
-        </p:nvSpPr>
-        <p:spPr>
-          <a:xfrm>
-            <a:off x="838200" y="1064712"/>
-            <a:ext cx="10515600" cy="5112251"/>
-          </a:xfrm>
-        </p:spPr>
-        <p:txBody>
-          <a:bodyPr>
-            <a:normAutofit/>
-          </a:bodyPr>
-          <a:lstStyle/>
-          <a:p>
-            <a:pPr marL="0" indent="0">
-              <a:buNone/>
-            </a:pPr>
-            <a:endParaRPr lang="tr-TR" sz="2600" dirty="0"/>
-          </a:p>
-          <a:p>
-            <a:pPr marL="0" indent="0">
-              <a:buNone/>
-            </a:pPr>
-            <a:endParaRPr lang="tr-TR" sz="2600" dirty="0"/>
-          </a:p>
-        </p:txBody>
-      </p:sp>
-      <p:pic>
-        <p:nvPicPr>
-          <p:cNvPr id="5" name="Resim 4" descr="metin, ekran görüntüsü, yazılım, sayı, numara içeren bir resim">
-            <a:extLst>
-              <a:ext uri="{FF2B5EF4-FFF2-40B4-BE49-F238E27FC236}">
-                <a16:creationId xmlns:a16="http://schemas.microsoft.com/office/drawing/2014/main" id="{DD3FEA77-A250-8E51-C2F6-0954B01C524A}"/>
-              </a:ext>
-            </a:extLst>
-          </p:cNvPr>
-          <p:cNvPicPr>
-            <a:picLocks noChangeAspect="1"/>
-          </p:cNvPicPr>
-          <p:nvPr/>
-        </p:nvPicPr>
-        <p:blipFill>
-          <a:blip r:embed="rId2">
-            <a:extLst>
-              <a:ext uri="{28A0092B-C50C-407E-A947-70E740481C1C}">
-                <a14:useLocalDpi xmlns:a14="http://schemas.microsoft.com/office/drawing/2010/main" val="0"/>
-              </a:ext>
-            </a:extLst>
-          </a:blip>
-          <a:stretch>
-            <a:fillRect/>
-          </a:stretch>
-        </p:blipFill>
-        <p:spPr>
-          <a:xfrm>
-            <a:off x="2316270" y="1408753"/>
-            <a:ext cx="6126271" cy="4040493"/>
-          </a:xfrm>
-          <a:prstGeom prst="rect">
-            <a:avLst/>
-          </a:prstGeom>
-        </p:spPr>
-      </p:pic>
-    </p:spTree>
-    <p:extLst>
-      <p:ext uri="{BB962C8B-B14F-4D97-AF65-F5344CB8AC3E}">
-        <p14:creationId xmlns:p14="http://schemas.microsoft.com/office/powerpoint/2010/main" val="2440872219"/>
       </p:ext>
     </p:extLst>
   </p:cSld>
@@ -8613,7 +8779,7 @@
             </a:pPr>
             <a:r>
               <a:rPr lang="tr-TR" sz="2800" dirty="0"/>
-              <a:t>Hızlı ve esnek NoSQL anahtar-değer ve belge Veritabanı sağlar. Oldukça maliyetlidir. Yönetici gerektiren sunucu yoktur.</a:t>
+              <a:t>Amazon DynamoDB, Amazon Web Services (AWS) tarafından sunulan yönetilen bir NoSQL veritabanı hizmetidir. DynamoDB, ölçeklenebilir, yüksek performanslı ve yüksek güvenilirlikte veritabanları oluşturmak ve yönetmek isteyen geliştiriciler için tasarlanmıştır.</a:t>
             </a:r>
           </a:p>
           <a:p>
@@ -10175,7 +10341,7 @@
         </p:spPr>
         <p:txBody>
           <a:bodyPr>
-            <a:normAutofit/>
+            <a:normAutofit lnSpcReduction="10000"/>
           </a:bodyPr>
           <a:lstStyle/>
           <a:p>
@@ -10244,35 +10410,17 @@
             </a:pPr>
             <a:r>
               <a:rPr lang="tr-TR" sz="2800" b="1" dirty="0"/>
-              <a:t>2-Command Line Interface</a:t>
-            </a:r>
-          </a:p>
-          <a:p>
-            <a:pPr algn="just"/>
-            <a:r>
-              <a:rPr lang="tr-TR" sz="2600" dirty="0"/>
-              <a:t>AWS hizmetlerinizi yönetme</a:t>
-            </a:r>
-          </a:p>
-          <a:p>
-            <a:pPr algn="just"/>
-            <a:r>
-              <a:rPr lang="tr-TR" sz="2600" dirty="0"/>
-              <a:t>Windows, MacOS ve Linux ile kullanılabilir.</a:t>
-            </a:r>
-          </a:p>
-          <a:p>
-            <a:pPr algn="just"/>
-            <a:r>
-              <a:rPr lang="tr-TR" sz="2600" dirty="0"/>
-              <a:t>Betiklerle hizmetleri otomatikleştirme imkanı sunar.</a:t>
-            </a:r>
-          </a:p>
-          <a:p>
-            <a:pPr marL="0" indent="0" algn="just">
-              <a:buNone/>
-            </a:pPr>
-            <a:endParaRPr lang="tr-TR" sz="2600" dirty="0"/>
+              <a:t>2-Command Line Interface </a:t>
+            </a:r>
+          </a:p>
+          <a:p>
+            <a:pPr marL="0" indent="0" algn="just">
+              <a:buNone/>
+            </a:pPr>
+            <a:r>
+              <a:rPr lang="tr-TR" sz="2600" dirty="0"/>
+              <a:t>Command Line Interface (CLI), kullanıcının bilgisayar veya sunucu işletim sistemiyle etkileşimde bulunmasına olanak tanıyan metin tabanlı bir kullanıcı arayüzüdür. CLI, komut satırı veya terminal olarak da adlandırılır ve kullanıcının komutları metin olarak girip işletim sistemine iletebilmesini sağlar.</a:t>
+            </a:r>
           </a:p>
         </p:txBody>
       </p:sp>
@@ -11038,7 +11186,7 @@
             </a:pPr>
             <a:r>
               <a:rPr lang="tr-TR" sz="2600" dirty="0"/>
-              <a:t>AWS Secrets Manager</a:t>
+              <a:t>AWS Secrets Manager </a:t>
             </a:r>
           </a:p>
           <a:p>
@@ -13077,7 +13225,7 @@
         </p:spPr>
         <p:txBody>
           <a:bodyPr>
-            <a:normAutofit fontScale="92500" lnSpcReduction="20000"/>
+            <a:normAutofit fontScale="85000" lnSpcReduction="20000"/>
           </a:bodyPr>
           <a:lstStyle/>
           <a:p>
@@ -13153,21 +13301,16 @@
             </a:pPr>
             <a:r>
               <a:rPr lang="tr-TR" sz="3000" b="1" dirty="0"/>
-              <a:t>AWS CloudFormation</a:t>
-            </a:r>
-          </a:p>
-          <a:p>
-            <a:pPr algn="just"/>
-            <a:r>
-              <a:rPr lang="tr-TR" sz="2600" dirty="0"/>
-              <a:t>Bulut ortamınızı modelleyin ve tedarik edin.</a:t>
-            </a:r>
-          </a:p>
-          <a:p>
-            <a:pPr algn="just"/>
-            <a:r>
-              <a:rPr lang="tr-TR" sz="2600" dirty="0"/>
-              <a:t>Hatalarla karşılaşmanız halinde değişikleri otomatik olarak geri alın.</a:t>
+              <a:t>AWS CloudFormation </a:t>
+            </a:r>
+          </a:p>
+          <a:p>
+            <a:pPr marL="0" indent="0" algn="just">
+              <a:buNone/>
+            </a:pPr>
+            <a:r>
+              <a:rPr lang="tr-TR" sz="2600" dirty="0"/>
+              <a:t>AWS CloudFormation, Amazon Web Services (AWS) tarafından sunulan bir hizmettir ve altyapı kaynaklarını (örneğin, sanal sunucular, ağ yapılandırmaları, veritabanları) kodla tanımlamanızı, dağıtmanızı ve yönetmenizi sağlar. Bu hizmet, altyapı kaynaklarını AWS Bulutunda isteğe bağlı ve tekrar kullanılabilir bir şekilde oluşturmanıza ve dağıtmanıza yardımcı olur.</a:t>
             </a:r>
           </a:p>
         </p:txBody>
@@ -14873,6 +15016,69 @@
     <p:extLst>
       <p:ext uri="{BB962C8B-B14F-4D97-AF65-F5344CB8AC3E}">
         <p14:creationId xmlns:p14="http://schemas.microsoft.com/office/powerpoint/2010/main" val="3900115794"/>
+      </p:ext>
+    </p:extLst>
+  </p:cSld>
+  <p:clrMapOvr>
+    <a:masterClrMapping/>
+  </p:clrMapOvr>
+</p:sld>
+</file>
+
+<file path=ppt/slides/slide54.xml><?xml version="1.0" encoding="utf-8"?>
+<p:sld xmlns:a="http://schemas.openxmlformats.org/drawingml/2006/main" xmlns:r="http://schemas.openxmlformats.org/officeDocument/2006/relationships" xmlns:p="http://schemas.openxmlformats.org/presentationml/2006/main">
+  <p:cSld>
+    <p:spTree>
+      <p:nvGrpSpPr>
+        <p:cNvPr id="1" name=""/>
+        <p:cNvGrpSpPr/>
+        <p:nvPr/>
+      </p:nvGrpSpPr>
+      <p:grpSpPr>
+        <a:xfrm>
+          <a:off x="0" y="0"/>
+          <a:ext cx="0" cy="0"/>
+          <a:chOff x="0" y="0"/>
+          <a:chExt cx="0" cy="0"/>
+        </a:xfrm>
+      </p:grpSpPr>
+      <p:sp>
+        <p:nvSpPr>
+          <p:cNvPr id="3" name="İçerik Yer Tutucusu 2">
+            <a:extLst>
+              <a:ext uri="{FF2B5EF4-FFF2-40B4-BE49-F238E27FC236}">
+                <a16:creationId xmlns:a16="http://schemas.microsoft.com/office/drawing/2014/main" id="{332A08EA-7E3F-65B8-C9CA-94F9514450A5}"/>
+              </a:ext>
+            </a:extLst>
+          </p:cNvPr>
+          <p:cNvSpPr>
+            <a:spLocks noGrp="1"/>
+          </p:cNvSpPr>
+          <p:nvPr>
+            <p:ph idx="1"/>
+          </p:nvPr>
+        </p:nvSpPr>
+        <p:spPr/>
+        <p:txBody>
+          <a:bodyPr>
+            <a:normAutofit/>
+          </a:bodyPr>
+          <a:lstStyle/>
+          <a:p>
+            <a:pPr marL="0" indent="0" algn="ctr">
+              <a:buNone/>
+            </a:pPr>
+            <a:r>
+              <a:rPr lang="tr-TR" sz="5400" dirty="0"/>
+              <a:t>BENİ DİNLEDİĞİNİZ İÇİN TEŞEKKÜR EDERİM.</a:t>
+            </a:r>
+          </a:p>
+        </p:txBody>
+      </p:sp>
+    </p:spTree>
+    <p:extLst>
+      <p:ext uri="{BB962C8B-B14F-4D97-AF65-F5344CB8AC3E}">
+        <p14:creationId xmlns:p14="http://schemas.microsoft.com/office/powerpoint/2010/main" val="1580297389"/>
       </p:ext>
     </p:extLst>
   </p:cSld>

</xml_diff>